<commit_message>
v1 du rapport et de la présentation
</commit_message>
<xml_diff>
--- a/Catégorisez automatiquement des questions (soutenance).pptx
+++ b/Catégorisez automatiquement des questions (soutenance).pptx
@@ -216,7 +216,7 @@
           <a:p>
             <a:fld id="{E26BA012-27C5-446B-ADB6-913432598EA1}" type="datetimeFigureOut">
               <a:rPr lang="fr-FR" smtClean="0"/>
-              <a:t>24/01/2020</a:t>
+              <a:t>25/01/2020</a:t>
             </a:fld>
             <a:endParaRPr lang="fr-FR"/>
           </a:p>
@@ -630,7 +630,7 @@
           <a:p>
             <a:fld id="{F0C2CE76-4C59-4655-A7EC-0755846AD45B}" type="datetimeFigureOut">
               <a:rPr lang="fr-FR" smtClean="0"/>
-              <a:t>24/01/2020</a:t>
+              <a:t>25/01/2020</a:t>
             </a:fld>
             <a:endParaRPr lang="fr-FR"/>
           </a:p>
@@ -828,7 +828,7 @@
           <a:p>
             <a:fld id="{F0C2CE76-4C59-4655-A7EC-0755846AD45B}" type="datetimeFigureOut">
               <a:rPr lang="fr-FR" smtClean="0"/>
-              <a:t>24/01/2020</a:t>
+              <a:t>25/01/2020</a:t>
             </a:fld>
             <a:endParaRPr lang="fr-FR"/>
           </a:p>
@@ -1036,7 +1036,7 @@
           <a:p>
             <a:fld id="{F0C2CE76-4C59-4655-A7EC-0755846AD45B}" type="datetimeFigureOut">
               <a:rPr lang="fr-FR" smtClean="0"/>
-              <a:t>24/01/2020</a:t>
+              <a:t>25/01/2020</a:t>
             </a:fld>
             <a:endParaRPr lang="fr-FR"/>
           </a:p>
@@ -1234,7 +1234,7 @@
           <a:p>
             <a:fld id="{F0C2CE76-4C59-4655-A7EC-0755846AD45B}" type="datetimeFigureOut">
               <a:rPr lang="fr-FR" smtClean="0"/>
-              <a:t>24/01/2020</a:t>
+              <a:t>25/01/2020</a:t>
             </a:fld>
             <a:endParaRPr lang="fr-FR"/>
           </a:p>
@@ -1509,7 +1509,7 @@
           <a:p>
             <a:fld id="{F0C2CE76-4C59-4655-A7EC-0755846AD45B}" type="datetimeFigureOut">
               <a:rPr lang="fr-FR" smtClean="0"/>
-              <a:t>24/01/2020</a:t>
+              <a:t>25/01/2020</a:t>
             </a:fld>
             <a:endParaRPr lang="fr-FR"/>
           </a:p>
@@ -1774,7 +1774,7 @@
           <a:p>
             <a:fld id="{F0C2CE76-4C59-4655-A7EC-0755846AD45B}" type="datetimeFigureOut">
               <a:rPr lang="fr-FR" smtClean="0"/>
-              <a:t>24/01/2020</a:t>
+              <a:t>25/01/2020</a:t>
             </a:fld>
             <a:endParaRPr lang="fr-FR"/>
           </a:p>
@@ -2186,7 +2186,7 @@
           <a:p>
             <a:fld id="{F0C2CE76-4C59-4655-A7EC-0755846AD45B}" type="datetimeFigureOut">
               <a:rPr lang="fr-FR" smtClean="0"/>
-              <a:t>24/01/2020</a:t>
+              <a:t>25/01/2020</a:t>
             </a:fld>
             <a:endParaRPr lang="fr-FR"/>
           </a:p>
@@ -2327,7 +2327,7 @@
           <a:p>
             <a:fld id="{F0C2CE76-4C59-4655-A7EC-0755846AD45B}" type="datetimeFigureOut">
               <a:rPr lang="fr-FR" smtClean="0"/>
-              <a:t>24/01/2020</a:t>
+              <a:t>25/01/2020</a:t>
             </a:fld>
             <a:endParaRPr lang="fr-FR"/>
           </a:p>
@@ -2440,7 +2440,7 @@
           <a:p>
             <a:fld id="{F0C2CE76-4C59-4655-A7EC-0755846AD45B}" type="datetimeFigureOut">
               <a:rPr lang="fr-FR" smtClean="0"/>
-              <a:t>24/01/2020</a:t>
+              <a:t>25/01/2020</a:t>
             </a:fld>
             <a:endParaRPr lang="fr-FR"/>
           </a:p>
@@ -2751,7 +2751,7 @@
           <a:p>
             <a:fld id="{F0C2CE76-4C59-4655-A7EC-0755846AD45B}" type="datetimeFigureOut">
               <a:rPr lang="fr-FR" smtClean="0"/>
-              <a:t>24/01/2020</a:t>
+              <a:t>25/01/2020</a:t>
             </a:fld>
             <a:endParaRPr lang="fr-FR"/>
           </a:p>
@@ -3039,7 +3039,7 @@
           <a:p>
             <a:fld id="{F0C2CE76-4C59-4655-A7EC-0755846AD45B}" type="datetimeFigureOut">
               <a:rPr lang="fr-FR" smtClean="0"/>
-              <a:t>24/01/2020</a:t>
+              <a:t>25/01/2020</a:t>
             </a:fld>
             <a:endParaRPr lang="fr-FR"/>
           </a:p>
@@ -3280,7 +3280,7 @@
           <a:p>
             <a:fld id="{F0C2CE76-4C59-4655-A7EC-0755846AD45B}" type="datetimeFigureOut">
               <a:rPr lang="fr-FR" smtClean="0"/>
-              <a:t>24/01/2020</a:t>
+              <a:t>25/01/2020</a:t>
             </a:fld>
             <a:endParaRPr lang="fr-FR"/>
           </a:p>
@@ -18705,194 +18705,6 @@
           </a:prstGeom>
         </p:spPr>
       </p:pic>
-      <p:pic>
-        <p:nvPicPr>
-          <p:cNvPr id="14346" name="Image 11" descr="CD24AF53">
-            <a:extLst>
-              <a:ext uri="{FF2B5EF4-FFF2-40B4-BE49-F238E27FC236}">
-                <a16:creationId xmlns:a16="http://schemas.microsoft.com/office/drawing/2014/main" id="{01429F22-A3C7-4EB2-A7DD-46A4E81EAA43}"/>
-              </a:ext>
-            </a:extLst>
-          </p:cNvPr>
-          <p:cNvPicPr>
-            <a:picLocks noChangeAspect="1" noChangeArrowheads="1"/>
-          </p:cNvPicPr>
-          <p:nvPr/>
-        </p:nvPicPr>
-        <p:blipFill>
-          <a:blip r:embed="rId4">
-            <a:extLst>
-              <a:ext uri="{28A0092B-C50C-407E-A947-70E740481C1C}">
-                <a14:useLocalDpi xmlns:a14="http://schemas.microsoft.com/office/drawing/2010/main" val="0"/>
-              </a:ext>
-            </a:extLst>
-          </a:blip>
-          <a:srcRect/>
-          <a:stretch>
-            <a:fillRect/>
-          </a:stretch>
-        </p:blipFill>
-        <p:spPr bwMode="auto">
-          <a:xfrm>
-            <a:off x="0" y="0"/>
-            <a:ext cx="2266950" cy="1219200"/>
-          </a:xfrm>
-          <a:prstGeom prst="rect">
-            <a:avLst/>
-          </a:prstGeom>
-          <a:noFill/>
-          <a:extLst>
-            <a:ext uri="{909E8E84-426E-40DD-AFC4-6F175D3DCCD1}">
-              <a14:hiddenFill xmlns:a14="http://schemas.microsoft.com/office/drawing/2010/main">
-                <a:solidFill>
-                  <a:srgbClr val="FFFFFF"/>
-                </a:solidFill>
-              </a14:hiddenFill>
-            </a:ext>
-          </a:extLst>
-        </p:spPr>
-      </p:pic>
-      <p:pic>
-        <p:nvPicPr>
-          <p:cNvPr id="14345" name="Image 12" descr="6B7AF7D9">
-            <a:extLst>
-              <a:ext uri="{FF2B5EF4-FFF2-40B4-BE49-F238E27FC236}">
-                <a16:creationId xmlns:a16="http://schemas.microsoft.com/office/drawing/2014/main" id="{154A73EB-C437-429C-B6E8-BABF48CDFB2A}"/>
-              </a:ext>
-            </a:extLst>
-          </p:cNvPr>
-          <p:cNvPicPr>
-            <a:picLocks noChangeAspect="1" noChangeArrowheads="1"/>
-          </p:cNvPicPr>
-          <p:nvPr/>
-        </p:nvPicPr>
-        <p:blipFill>
-          <a:blip r:embed="rId5">
-            <a:extLst>
-              <a:ext uri="{28A0092B-C50C-407E-A947-70E740481C1C}">
-                <a14:useLocalDpi xmlns:a14="http://schemas.microsoft.com/office/drawing/2010/main" val="0"/>
-              </a:ext>
-            </a:extLst>
-          </a:blip>
-          <a:srcRect/>
-          <a:stretch>
-            <a:fillRect/>
-          </a:stretch>
-        </p:blipFill>
-        <p:spPr bwMode="auto">
-          <a:xfrm>
-            <a:off x="0" y="0"/>
-            <a:ext cx="2266950" cy="1219200"/>
-          </a:xfrm>
-          <a:prstGeom prst="rect">
-            <a:avLst/>
-          </a:prstGeom>
-          <a:noFill/>
-          <a:extLst>
-            <a:ext uri="{909E8E84-426E-40DD-AFC4-6F175D3DCCD1}">
-              <a14:hiddenFill xmlns:a14="http://schemas.microsoft.com/office/drawing/2010/main">
-                <a:solidFill>
-                  <a:srgbClr val="FFFFFF"/>
-                </a:solidFill>
-              </a14:hiddenFill>
-            </a:ext>
-          </a:extLst>
-        </p:spPr>
-      </p:pic>
-      <p:pic>
-        <p:nvPicPr>
-          <p:cNvPr id="14344" name="Image 14" descr="DBD1004F">
-            <a:extLst>
-              <a:ext uri="{FF2B5EF4-FFF2-40B4-BE49-F238E27FC236}">
-                <a16:creationId xmlns:a16="http://schemas.microsoft.com/office/drawing/2014/main" id="{0504C0AE-6789-44CD-A0EF-508876BCB438}"/>
-              </a:ext>
-            </a:extLst>
-          </p:cNvPr>
-          <p:cNvPicPr>
-            <a:picLocks noChangeAspect="1" noChangeArrowheads="1"/>
-          </p:cNvPicPr>
-          <p:nvPr/>
-        </p:nvPicPr>
-        <p:blipFill>
-          <a:blip r:embed="rId6">
-            <a:extLst>
-              <a:ext uri="{28A0092B-C50C-407E-A947-70E740481C1C}">
-                <a14:useLocalDpi xmlns:a14="http://schemas.microsoft.com/office/drawing/2010/main" val="0"/>
-              </a:ext>
-            </a:extLst>
-          </a:blip>
-          <a:srcRect/>
-          <a:stretch>
-            <a:fillRect/>
-          </a:stretch>
-        </p:blipFill>
-        <p:spPr bwMode="auto">
-          <a:xfrm>
-            <a:off x="0" y="0"/>
-            <a:ext cx="2266950" cy="1219200"/>
-          </a:xfrm>
-          <a:prstGeom prst="rect">
-            <a:avLst/>
-          </a:prstGeom>
-          <a:noFill/>
-          <a:extLst>
-            <a:ext uri="{909E8E84-426E-40DD-AFC4-6F175D3DCCD1}">
-              <a14:hiddenFill xmlns:a14="http://schemas.microsoft.com/office/drawing/2010/main">
-                <a:solidFill>
-                  <a:srgbClr val="FFFFFF"/>
-                </a:solidFill>
-              </a14:hiddenFill>
-            </a:ext>
-          </a:extLst>
-        </p:spPr>
-      </p:pic>
-      <p:pic>
-        <p:nvPicPr>
-          <p:cNvPr id="14343" name="Image 18" descr="806F9C51">
-            <a:extLst>
-              <a:ext uri="{FF2B5EF4-FFF2-40B4-BE49-F238E27FC236}">
-                <a16:creationId xmlns:a16="http://schemas.microsoft.com/office/drawing/2014/main" id="{E7D8AC3E-11BE-412D-BE1F-7D2B78428A79}"/>
-              </a:ext>
-            </a:extLst>
-          </p:cNvPr>
-          <p:cNvPicPr>
-            <a:picLocks noChangeAspect="1" noChangeArrowheads="1"/>
-          </p:cNvPicPr>
-          <p:nvPr/>
-        </p:nvPicPr>
-        <p:blipFill>
-          <a:blip r:embed="rId7">
-            <a:extLst>
-              <a:ext uri="{28A0092B-C50C-407E-A947-70E740481C1C}">
-                <a14:useLocalDpi xmlns:a14="http://schemas.microsoft.com/office/drawing/2010/main" val="0"/>
-              </a:ext>
-            </a:extLst>
-          </a:blip>
-          <a:srcRect/>
-          <a:stretch>
-            <a:fillRect/>
-          </a:stretch>
-        </p:blipFill>
-        <p:spPr bwMode="auto">
-          <a:xfrm>
-            <a:off x="0" y="0"/>
-            <a:ext cx="2276475" cy="1219200"/>
-          </a:xfrm>
-          <a:prstGeom prst="rect">
-            <a:avLst/>
-          </a:prstGeom>
-          <a:noFill/>
-          <a:extLst>
-            <a:ext uri="{909E8E84-426E-40DD-AFC4-6F175D3DCCD1}">
-              <a14:hiddenFill xmlns:a14="http://schemas.microsoft.com/office/drawing/2010/main">
-                <a:solidFill>
-                  <a:srgbClr val="FFFFFF"/>
-                </a:solidFill>
-              </a14:hiddenFill>
-            </a:ext>
-          </a:extLst>
-        </p:spPr>
-      </p:pic>
     </p:spTree>
     <p:extLst>
       <p:ext uri="{BB962C8B-B14F-4D97-AF65-F5344CB8AC3E}">
@@ -24552,7 +24364,7 @@
             </a:pPr>
             <a:r>
               <a:rPr lang="fr-FR" sz="2000" dirty="0"/>
-              <a:t>Il faudrait arriver à gérer l’effet de bord induit par le faible taille des documents qui n’aide pas à bien discriminer les mots qui importent dans chaque document au sein d’une matrice TF-IDF.</a:t>
+              <a:t>Il faudrait arriver à gérer l’effet de bord induit par la faible taille des documents qui n’aide pas à bien discriminer les mots qui importent dans chaque document au sein d’une matrice TF-IDF.</a:t>
             </a:r>
           </a:p>
           <a:p>
@@ -24594,7 +24406,7 @@
             </a:pPr>
             <a:r>
               <a:rPr lang="fr-FR" sz="2000" dirty="0"/>
-              <a:t>Au lieu d’avoir un unique modèle supervisé pour prédire l’ensemble des tags, il ne serait pas inintéressant d’isoler les tags identifiant une technologie des autres tags. Je spécialiserais alors un classifieur à prédire la technologie ou langage concernée par la question tandis qu’un autre classifieur se concentrerait plutôt à décrire la nature du problème. </a:t>
+              <a:t>Au lieu d’avoir un unique modèle supervisé pour prédire l’ensemble des tags, il ne serait pas inintéressant d’isoler les tags identifiant une technologie des autres tags. Je spécialiserais alors un classifieur à prédire la technologie concerné par la question tandis qu’un autre classifieur se concentrerait plutôt à décrire la nature du problème. </a:t>
             </a:r>
           </a:p>
         </p:txBody>

</xml_diff>

<commit_message>
v2 du rapport et de la présentation
</commit_message>
<xml_diff>
--- a/Catégorisez automatiquement des questions (soutenance).pptx
+++ b/Catégorisez automatiquement des questions (soutenance).pptx
@@ -216,7 +216,7 @@
           <a:p>
             <a:fld id="{E26BA012-27C5-446B-ADB6-913432598EA1}" type="datetimeFigureOut">
               <a:rPr lang="fr-FR" smtClean="0"/>
-              <a:t>26/01/2020</a:t>
+              <a:t>27/01/2020</a:t>
             </a:fld>
             <a:endParaRPr lang="fr-FR"/>
           </a:p>
@@ -630,7 +630,7 @@
           <a:p>
             <a:fld id="{F0C2CE76-4C59-4655-A7EC-0755846AD45B}" type="datetimeFigureOut">
               <a:rPr lang="fr-FR" smtClean="0"/>
-              <a:t>26/01/2020</a:t>
+              <a:t>27/01/2020</a:t>
             </a:fld>
             <a:endParaRPr lang="fr-FR"/>
           </a:p>
@@ -828,7 +828,7 @@
           <a:p>
             <a:fld id="{F0C2CE76-4C59-4655-A7EC-0755846AD45B}" type="datetimeFigureOut">
               <a:rPr lang="fr-FR" smtClean="0"/>
-              <a:t>26/01/2020</a:t>
+              <a:t>27/01/2020</a:t>
             </a:fld>
             <a:endParaRPr lang="fr-FR"/>
           </a:p>
@@ -1036,7 +1036,7 @@
           <a:p>
             <a:fld id="{F0C2CE76-4C59-4655-A7EC-0755846AD45B}" type="datetimeFigureOut">
               <a:rPr lang="fr-FR" smtClean="0"/>
-              <a:t>26/01/2020</a:t>
+              <a:t>27/01/2020</a:t>
             </a:fld>
             <a:endParaRPr lang="fr-FR"/>
           </a:p>
@@ -1234,7 +1234,7 @@
           <a:p>
             <a:fld id="{F0C2CE76-4C59-4655-A7EC-0755846AD45B}" type="datetimeFigureOut">
               <a:rPr lang="fr-FR" smtClean="0"/>
-              <a:t>26/01/2020</a:t>
+              <a:t>27/01/2020</a:t>
             </a:fld>
             <a:endParaRPr lang="fr-FR"/>
           </a:p>
@@ -1509,7 +1509,7 @@
           <a:p>
             <a:fld id="{F0C2CE76-4C59-4655-A7EC-0755846AD45B}" type="datetimeFigureOut">
               <a:rPr lang="fr-FR" smtClean="0"/>
-              <a:t>26/01/2020</a:t>
+              <a:t>27/01/2020</a:t>
             </a:fld>
             <a:endParaRPr lang="fr-FR"/>
           </a:p>
@@ -1774,7 +1774,7 @@
           <a:p>
             <a:fld id="{F0C2CE76-4C59-4655-A7EC-0755846AD45B}" type="datetimeFigureOut">
               <a:rPr lang="fr-FR" smtClean="0"/>
-              <a:t>26/01/2020</a:t>
+              <a:t>27/01/2020</a:t>
             </a:fld>
             <a:endParaRPr lang="fr-FR"/>
           </a:p>
@@ -2186,7 +2186,7 @@
           <a:p>
             <a:fld id="{F0C2CE76-4C59-4655-A7EC-0755846AD45B}" type="datetimeFigureOut">
               <a:rPr lang="fr-FR" smtClean="0"/>
-              <a:t>26/01/2020</a:t>
+              <a:t>27/01/2020</a:t>
             </a:fld>
             <a:endParaRPr lang="fr-FR"/>
           </a:p>
@@ -2327,7 +2327,7 @@
           <a:p>
             <a:fld id="{F0C2CE76-4C59-4655-A7EC-0755846AD45B}" type="datetimeFigureOut">
               <a:rPr lang="fr-FR" smtClean="0"/>
-              <a:t>26/01/2020</a:t>
+              <a:t>27/01/2020</a:t>
             </a:fld>
             <a:endParaRPr lang="fr-FR"/>
           </a:p>
@@ -2440,7 +2440,7 @@
           <a:p>
             <a:fld id="{F0C2CE76-4C59-4655-A7EC-0755846AD45B}" type="datetimeFigureOut">
               <a:rPr lang="fr-FR" smtClean="0"/>
-              <a:t>26/01/2020</a:t>
+              <a:t>27/01/2020</a:t>
             </a:fld>
             <a:endParaRPr lang="fr-FR"/>
           </a:p>
@@ -2751,7 +2751,7 @@
           <a:p>
             <a:fld id="{F0C2CE76-4C59-4655-A7EC-0755846AD45B}" type="datetimeFigureOut">
               <a:rPr lang="fr-FR" smtClean="0"/>
-              <a:t>26/01/2020</a:t>
+              <a:t>27/01/2020</a:t>
             </a:fld>
             <a:endParaRPr lang="fr-FR"/>
           </a:p>
@@ -3039,7 +3039,7 @@
           <a:p>
             <a:fld id="{F0C2CE76-4C59-4655-A7EC-0755846AD45B}" type="datetimeFigureOut">
               <a:rPr lang="fr-FR" smtClean="0"/>
-              <a:t>26/01/2020</a:t>
+              <a:t>27/01/2020</a:t>
             </a:fld>
             <a:endParaRPr lang="fr-FR"/>
           </a:p>
@@ -3280,7 +3280,7 @@
           <a:p>
             <a:fld id="{F0C2CE76-4C59-4655-A7EC-0755846AD45B}" type="datetimeFigureOut">
               <a:rPr lang="fr-FR" smtClean="0"/>
-              <a:t>26/01/2020</a:t>
+              <a:t>27/01/2020</a:t>
             </a:fld>
             <a:endParaRPr lang="fr-FR"/>
           </a:p>
@@ -17508,7 +17508,7 @@
         <p:spPr>
           <a:xfrm>
             <a:off x="6096000" y="1453113"/>
-            <a:ext cx="5673969" cy="1753109"/>
+            <a:ext cx="5673969" cy="2149306"/>
           </a:xfrm>
           <a:prstGeom prst="rect">
             <a:avLst/>
@@ -17542,8 +17542,29 @@
                 <a:ea typeface="Calibri" panose="020F0502020204030204" pitchFamily="34" charset="0"/>
                 <a:cs typeface="Times New Roman" panose="02020603050405020304" pitchFamily="18" charset="0"/>
               </a:rPr>
-              <a:t> Relevance</a:t>
-            </a:r>
+              <a:t> Relevance </a:t>
+            </a:r>
+            <a:r>
+              <a:rPr lang="fr-FR" i="1" dirty="0">
+                <a:latin typeface="Calibri" panose="020F0502020204030204" pitchFamily="34" charset="0"/>
+                <a:ea typeface="Calibri" panose="020F0502020204030204" pitchFamily="34" charset="0"/>
+                <a:cs typeface="Times New Roman" panose="02020603050405020304" pitchFamily="18" charset="0"/>
+              </a:rPr>
+              <a:t>(</a:t>
+            </a:r>
+            <a:r>
+              <a:rPr lang="fr-FR" i="1" dirty="0" err="1"/>
+              <a:t>OneVsRestClassifier</a:t>
+            </a:r>
+            <a:r>
+              <a:rPr lang="fr-FR" i="1" dirty="0"/>
+              <a:t>)</a:t>
+            </a:r>
+            <a:endParaRPr lang="fr-FR" i="1" dirty="0">
+              <a:latin typeface="Calibri" panose="020F0502020204030204" pitchFamily="34" charset="0"/>
+              <a:ea typeface="Calibri" panose="020F0502020204030204" pitchFamily="34" charset="0"/>
+              <a:cs typeface="Times New Roman" panose="02020603050405020304" pitchFamily="18" charset="0"/>
+            </a:endParaRPr>
           </a:p>
           <a:p>
             <a:pPr marL="285750" indent="-285750">
@@ -17600,6 +17621,23 @@
               </a:rPr>
               <a:t>Présomption d’indépendance des labels entre eux</a:t>
             </a:r>
+          </a:p>
+          <a:p>
+            <a:pPr marL="285750" indent="-285750" algn="just">
+              <a:lnSpc>
+                <a:spcPct val="106000"/>
+              </a:lnSpc>
+              <a:spcAft>
+                <a:spcPts val="800"/>
+              </a:spcAft>
+              <a:buFontTx/>
+              <a:buChar char="-"/>
+            </a:pPr>
+            <a:endParaRPr lang="fr-FR" dirty="0">
+              <a:latin typeface="Calibri" panose="020F0502020204030204" pitchFamily="34" charset="0"/>
+              <a:ea typeface="Calibri" panose="020F0502020204030204" pitchFamily="34" charset="0"/>
+              <a:cs typeface="Times New Roman" panose="02020603050405020304" pitchFamily="18" charset="0"/>
+            </a:endParaRPr>
           </a:p>
         </p:txBody>
       </p:sp>
@@ -20796,21 +20834,7 @@
             </a:pPr>
             <a:r>
               <a:rPr lang="fr-FR" sz="2000" dirty="0"/>
-              <a:t>Pour le modèle non supervisé, supprimer les mots les plus fréquents par topic pourrait permettre d’amener un peu plus de spécificité. Je pourrais peut-être aussi gagner en spécificité en intégrant des n-grams ou en utilisant des techniques de plongements de mots.  </a:t>
-            </a:r>
-          </a:p>
-          <a:p>
-            <a:pPr algn="l"/>
-            <a:endParaRPr lang="fr-FR" sz="2000" dirty="0"/>
-          </a:p>
-          <a:p>
-            <a:pPr marL="342900" indent="-342900" algn="l">
-              <a:buFontTx/>
-              <a:buChar char="-"/>
-            </a:pPr>
-            <a:r>
-              <a:rPr lang="fr-FR" sz="2000" dirty="0"/>
-              <a:t>Il faudrait arriver à gérer l’effet de bord induit par la faible taille des documents qui n’aide pas à bien discriminer les mots qui importent dans chaque document au sein d’une matrice TF-IDF.</a:t>
+              <a:t>Pour le modèle non supervisé, retirer les mots les plus fréquents par topic pourrait permettre d’amener un peu plus de spécificité. Je pourrais gagner en spécificité en intégrant des n-grams ou en utilisant des techniques de plongements de mots pour prendre en compte le contexte. </a:t>
             </a:r>
           </a:p>
           <a:p>
@@ -20827,15 +20851,7 @@
             </a:pPr>
             <a:r>
               <a:rPr lang="fr-FR" sz="2000" dirty="0"/>
-              <a:t>Je pourrais éviter de prédire les mêmes tags entre supervisé et non supervisé et donc intégrer les tags comme </a:t>
-            </a:r>
-            <a:r>
-              <a:rPr lang="fr-FR" sz="2000" dirty="0" err="1"/>
-              <a:t>stopwords</a:t>
-            </a:r>
-            <a:r>
-              <a:rPr lang="fr-FR" sz="2000" dirty="0"/>
-              <a:t> pour la matrice TF-IDF. </a:t>
+              <a:t>Il faudrait arriver à gérer l’effet de bord induit par la faible taille des documents qui n’aide pas à bien discriminer les mots qui importent dans chaque document au sein d’une matrice TF-IDF.</a:t>
             </a:r>
           </a:p>
           <a:p>
@@ -20852,7 +20868,32 @@
             </a:pPr>
             <a:r>
               <a:rPr lang="fr-FR" sz="2000" dirty="0"/>
-              <a:t>Au lieu d’avoir un unique modèle supervisé pour prédire l’ensemble des tags, il ne serait pas inintéressant d’isoler les tags identifiant une technologie des autres tags. Je spécialiserais alors un classifieur à prédire la technologie concerné par la question tandis qu’un autre classifieur se concentrerait plutôt à décrire la nature du problème. </a:t>
+              <a:t>Je pourrais éviter de prédire les mêmes tags entre supervisé et non supervisé et donc intégrer les tags comme </a:t>
+            </a:r>
+            <a:r>
+              <a:rPr lang="fr-FR" sz="2000" dirty="0" err="1"/>
+              <a:t>stopwords</a:t>
+            </a:r>
+            <a:r>
+              <a:rPr lang="fr-FR" sz="2000" dirty="0"/>
+              <a:t> pour la matrice TF-IDF. </a:t>
+            </a:r>
+          </a:p>
+          <a:p>
+            <a:pPr marL="342900" indent="-342900" algn="l">
+              <a:buFontTx/>
+              <a:buChar char="-"/>
+            </a:pPr>
+            <a:endParaRPr lang="fr-FR" sz="2000" dirty="0"/>
+          </a:p>
+          <a:p>
+            <a:pPr marL="342900" indent="-342900" algn="l">
+              <a:buFontTx/>
+              <a:buChar char="-"/>
+            </a:pPr>
+            <a:r>
+              <a:rPr lang="fr-FR" sz="2000" dirty="0"/>
+              <a:t>Au lieu d’avoir un unique modèle supervisé pour prédire l’ensemble des tags, il ne serait pas inintéressant d’isoler les tags identifiant une technologie des autres tags. Je spécialiserais alors un classifieur à prédire la technologie concernée par la question tandis qu’un autre classifieur se concentrerait plutôt à décrire la nature du problème. </a:t>
             </a:r>
           </a:p>
         </p:txBody>
@@ -23668,8 +23709,13 @@
             <a:pPr algn="l"/>
             <a:r>
               <a:rPr lang="fr-FR" sz="2000" dirty="0"/>
-              <a:t>Je ne conserve dans la colonne tags que les 3 tags les plus fréquents pour des raisons de parcimonie et considérant que 3 tags sont suffisants pour décrire une raison</a:t>
-            </a:r>
+              <a:t>Je ne conserve dans la colonne tags que les 3 tags les plus fréquents pour des raisons de parcimonie et considérant que 3 tags sont suffisants pour décrire </a:t>
+            </a:r>
+            <a:r>
+              <a:rPr lang="fr-FR" sz="2000"/>
+              <a:t>une question</a:t>
+            </a:r>
+            <a:endParaRPr lang="fr-FR" sz="2000" dirty="0"/>
           </a:p>
         </p:txBody>
       </p:sp>

</xml_diff>